<commit_message>
cap nhat 06/08/2015 - ntcong
Bổ sung chức năng login, logout
</commit_message>
<xml_diff>
--- a/Document/GioiThieu-FindMyPet.pptx
+++ b/Document/GioiThieu-FindMyPet.pptx
@@ -3611,6 +3611,10 @@
             </a:pPr>
             <a:r>
               <a:rPr lang="en-US" smtClean="0"/>
+              <a:t>Đặng Minh </a:t>
+            </a:r>
+            <a:r>
+              <a:rPr lang="en-US" smtClean="0"/>
               <a:t>Trí</a:t>
             </a:r>
             <a:endParaRPr lang="en-US" dirty="0"/>
@@ -3818,11 +3822,7 @@
             </a:r>
             <a:r>
               <a:rPr lang="en-US"/>
-              <a:t>thị các hình ảnh vui, clip vui về thú </a:t>
-            </a:r>
-            <a:r>
-              <a:rPr lang="en-US"/>
-              <a:t>cưng</a:t>
+              <a:t>thị các hình ảnh vui, clip vui về thú cưng</a:t>
             </a:r>
             <a:r>
               <a:rPr lang="en-US" smtClean="0"/>

</xml_diff>